<commit_message>
Updateing the Overlay When Equipping Abilities
</commit_message>
<xml_diff>
--- a/quest-system-ideas.pptx
+++ b/quest-system-ideas.pptx
@@ -116,6 +116,7 @@
 <p1510:revInfo xmlns:a="http://schemas.openxmlformats.org/drawingml/2006/main" xmlns:r="http://schemas.openxmlformats.org/officeDocument/2006/relationships" xmlns:p1510="http://schemas.microsoft.com/office/powerpoint/2015/10/main">
   <p1510:revLst>
     <p1510:client id="{D212F70A-6ACC-4C79-877F-59DD64694F27}" v="2" dt="2025-06-16T16:00:14.217"/>
+    <p1510:client id="{DB4AD81A-6DF0-4037-96B4-DE621E0C47AC}" v="1" dt="2025-06-17T13:08:21.314"/>
   </p1510:revLst>
 </p1510:revInfo>
 </file>
@@ -178,6 +179,77 @@
       </pc:sldChg>
     </pc:docChg>
   </pc:docChgLst>
+  <pc:docChgLst>
+    <pc:chgData name="Martin Jakob" userId="b29f0fed70fd886c" providerId="LiveId" clId="{DB4AD81A-6DF0-4037-96B4-DE621E0C47AC}"/>
+    <pc:docChg chg="undo custSel addSld delSld modSld sldOrd">
+      <pc:chgData name="Martin Jakob" userId="b29f0fed70fd886c" providerId="LiveId" clId="{DB4AD81A-6DF0-4037-96B4-DE621E0C47AC}" dt="2025-06-17T13:15:50.719" v="916" actId="47"/>
+      <pc:docMkLst>
+        <pc:docMk/>
+      </pc:docMkLst>
+      <pc:sldChg chg="modSp mod">
+        <pc:chgData name="Martin Jakob" userId="b29f0fed70fd886c" providerId="LiveId" clId="{DB4AD81A-6DF0-4037-96B4-DE621E0C47AC}" dt="2025-06-17T13:08:30.211" v="646" actId="20577"/>
+        <pc:sldMkLst>
+          <pc:docMk/>
+          <pc:sldMk cId="1095328715" sldId="256"/>
+        </pc:sldMkLst>
+        <pc:spChg chg="mod">
+          <ac:chgData name="Martin Jakob" userId="b29f0fed70fd886c" providerId="LiveId" clId="{DB4AD81A-6DF0-4037-96B4-DE621E0C47AC}" dt="2025-06-17T13:07:18.196" v="593" actId="20577"/>
+          <ac:spMkLst>
+            <pc:docMk/>
+            <pc:sldMk cId="1095328715" sldId="256"/>
+            <ac:spMk id="13" creationId="{18099247-5E1B-938F-3BBA-4D0ACA838327}"/>
+          </ac:spMkLst>
+        </pc:spChg>
+        <pc:spChg chg="mod">
+          <ac:chgData name="Martin Jakob" userId="b29f0fed70fd886c" providerId="LiveId" clId="{DB4AD81A-6DF0-4037-96B4-DE621E0C47AC}" dt="2025-06-17T13:00:05.573" v="189" actId="1076"/>
+          <ac:spMkLst>
+            <pc:docMk/>
+            <pc:sldMk cId="1095328715" sldId="256"/>
+            <ac:spMk id="14" creationId="{E77AA6DE-D724-90E9-A7DC-C3FD5068DDF7}"/>
+          </ac:spMkLst>
+        </pc:spChg>
+        <pc:spChg chg="mod">
+          <ac:chgData name="Martin Jakob" userId="b29f0fed70fd886c" providerId="LiveId" clId="{DB4AD81A-6DF0-4037-96B4-DE621E0C47AC}" dt="2025-06-17T13:08:30.211" v="646" actId="20577"/>
+          <ac:spMkLst>
+            <pc:docMk/>
+            <pc:sldMk cId="1095328715" sldId="256"/>
+            <ac:spMk id="15" creationId="{AE766D66-13A4-EA5F-E39E-46CA6626C98E}"/>
+          </ac:spMkLst>
+        </pc:spChg>
+        <pc:spChg chg="mod">
+          <ac:chgData name="Martin Jakob" userId="b29f0fed70fd886c" providerId="LiveId" clId="{DB4AD81A-6DF0-4037-96B4-DE621E0C47AC}" dt="2025-06-17T13:02:02.686" v="192" actId="1076"/>
+          <ac:spMkLst>
+            <pc:docMk/>
+            <pc:sldMk cId="1095328715" sldId="256"/>
+            <ac:spMk id="16" creationId="{F1812C2E-DD99-0DDE-0AF3-DEBCDB592526}"/>
+          </ac:spMkLst>
+        </pc:spChg>
+      </pc:sldChg>
+      <pc:sldChg chg="modSp new del mod ord">
+        <pc:chgData name="Martin Jakob" userId="b29f0fed70fd886c" providerId="LiveId" clId="{DB4AD81A-6DF0-4037-96B4-DE621E0C47AC}" dt="2025-06-17T13:15:50.719" v="916" actId="47"/>
+        <pc:sldMkLst>
+          <pc:docMk/>
+          <pc:sldMk cId="2545147801" sldId="257"/>
+        </pc:sldMkLst>
+        <pc:spChg chg="mod">
+          <ac:chgData name="Martin Jakob" userId="b29f0fed70fd886c" providerId="LiveId" clId="{DB4AD81A-6DF0-4037-96B4-DE621E0C47AC}" dt="2025-06-17T13:11:30.501" v="669" actId="20577"/>
+          <ac:spMkLst>
+            <pc:docMk/>
+            <pc:sldMk cId="2545147801" sldId="257"/>
+            <ac:spMk id="2" creationId="{91F7D12A-FD5D-4326-7E78-32AF015ADB4D}"/>
+          </ac:spMkLst>
+        </pc:spChg>
+        <pc:spChg chg="mod">
+          <ac:chgData name="Martin Jakob" userId="b29f0fed70fd886c" providerId="LiveId" clId="{DB4AD81A-6DF0-4037-96B4-DE621E0C47AC}" dt="2025-06-17T13:14:20.876" v="915" actId="20577"/>
+          <ac:spMkLst>
+            <pc:docMk/>
+            <pc:sldMk cId="2545147801" sldId="257"/>
+            <ac:spMk id="3" creationId="{63E3615F-30E8-C90F-1C30-C8FF007618E1}"/>
+          </ac:spMkLst>
+        </pc:spChg>
+      </pc:sldChg>
+    </pc:docChg>
+  </pc:docChgLst>
 </pc:chgInfo>
 </file>
 
@@ -330,7 +402,7 @@
           <a:p>
             <a:fld id="{B31A6FCB-09CE-491C-9AA8-38581EEC8131}" type="datetimeFigureOut">
               <a:rPr lang="de-CH" smtClean="0"/>
-              <a:t>16.06.2025</a:t>
+              <a:t>17.06.2025</a:t>
             </a:fld>
             <a:endParaRPr lang="de-CH"/>
           </a:p>
@@ -530,7 +602,7 @@
           <a:p>
             <a:fld id="{B31A6FCB-09CE-491C-9AA8-38581EEC8131}" type="datetimeFigureOut">
               <a:rPr lang="de-CH" smtClean="0"/>
-              <a:t>16.06.2025</a:t>
+              <a:t>17.06.2025</a:t>
             </a:fld>
             <a:endParaRPr lang="de-CH"/>
           </a:p>
@@ -740,7 +812,7 @@
           <a:p>
             <a:fld id="{B31A6FCB-09CE-491C-9AA8-38581EEC8131}" type="datetimeFigureOut">
               <a:rPr lang="de-CH" smtClean="0"/>
-              <a:t>16.06.2025</a:t>
+              <a:t>17.06.2025</a:t>
             </a:fld>
             <a:endParaRPr lang="de-CH"/>
           </a:p>
@@ -940,7 +1012,7 @@
           <a:p>
             <a:fld id="{B31A6FCB-09CE-491C-9AA8-38581EEC8131}" type="datetimeFigureOut">
               <a:rPr lang="de-CH" smtClean="0"/>
-              <a:t>16.06.2025</a:t>
+              <a:t>17.06.2025</a:t>
             </a:fld>
             <a:endParaRPr lang="de-CH"/>
           </a:p>
@@ -1216,7 +1288,7 @@
           <a:p>
             <a:fld id="{B31A6FCB-09CE-491C-9AA8-38581EEC8131}" type="datetimeFigureOut">
               <a:rPr lang="de-CH" smtClean="0"/>
-              <a:t>16.06.2025</a:t>
+              <a:t>17.06.2025</a:t>
             </a:fld>
             <a:endParaRPr lang="de-CH"/>
           </a:p>
@@ -1484,7 +1556,7 @@
           <a:p>
             <a:fld id="{B31A6FCB-09CE-491C-9AA8-38581EEC8131}" type="datetimeFigureOut">
               <a:rPr lang="de-CH" smtClean="0"/>
-              <a:t>16.06.2025</a:t>
+              <a:t>17.06.2025</a:t>
             </a:fld>
             <a:endParaRPr lang="de-CH"/>
           </a:p>
@@ -1899,7 +1971,7 @@
           <a:p>
             <a:fld id="{B31A6FCB-09CE-491C-9AA8-38581EEC8131}" type="datetimeFigureOut">
               <a:rPr lang="de-CH" smtClean="0"/>
-              <a:t>16.06.2025</a:t>
+              <a:t>17.06.2025</a:t>
             </a:fld>
             <a:endParaRPr lang="de-CH"/>
           </a:p>
@@ -2041,7 +2113,7 @@
           <a:p>
             <a:fld id="{B31A6FCB-09CE-491C-9AA8-38581EEC8131}" type="datetimeFigureOut">
               <a:rPr lang="de-CH" smtClean="0"/>
-              <a:t>16.06.2025</a:t>
+              <a:t>17.06.2025</a:t>
             </a:fld>
             <a:endParaRPr lang="de-CH"/>
           </a:p>
@@ -2154,7 +2226,7 @@
           <a:p>
             <a:fld id="{B31A6FCB-09CE-491C-9AA8-38581EEC8131}" type="datetimeFigureOut">
               <a:rPr lang="de-CH" smtClean="0"/>
-              <a:t>16.06.2025</a:t>
+              <a:t>17.06.2025</a:t>
             </a:fld>
             <a:endParaRPr lang="de-CH"/>
           </a:p>
@@ -2467,7 +2539,7 @@
           <a:p>
             <a:fld id="{B31A6FCB-09CE-491C-9AA8-38581EEC8131}" type="datetimeFigureOut">
               <a:rPr lang="de-CH" smtClean="0"/>
-              <a:t>16.06.2025</a:t>
+              <a:t>17.06.2025</a:t>
             </a:fld>
             <a:endParaRPr lang="de-CH"/>
           </a:p>
@@ -2756,7 +2828,7 @@
           <a:p>
             <a:fld id="{B31A6FCB-09CE-491C-9AA8-38581EEC8131}" type="datetimeFigureOut">
               <a:rPr lang="de-CH" smtClean="0"/>
-              <a:t>16.06.2025</a:t>
+              <a:t>17.06.2025</a:t>
             </a:fld>
             <a:endParaRPr lang="de-CH"/>
           </a:p>
@@ -2999,7 +3071,7 @@
           <a:p>
             <a:fld id="{B31A6FCB-09CE-491C-9AA8-38581EEC8131}" type="datetimeFigureOut">
               <a:rPr lang="de-CH" smtClean="0"/>
-              <a:t>16.06.2025</a:t>
+              <a:t>17.06.2025</a:t>
             </a:fld>
             <a:endParaRPr lang="de-CH"/>
           </a:p>
@@ -4666,8 +4738,8 @@
         </p:nvSpPr>
         <p:spPr>
           <a:xfrm>
-            <a:off x="525733" y="3727757"/>
-            <a:ext cx="11228920" cy="1218997"/>
+            <a:off x="525733" y="3518207"/>
+            <a:ext cx="11228920" cy="1439034"/>
           </a:xfrm>
           <a:prstGeom prst="rect">
             <a:avLst/>
@@ -4811,10 +4883,160 @@
                   <a:schemeClr val="tx1"/>
                 </a:solidFill>
               </a:rPr>
-              <a:t>)</a:t>
-            </a:r>
-          </a:p>
-          <a:p>
+              <a:t>) – </a:t>
+            </a:r>
+            <a:r>
+              <a:rPr lang="de-CH" sz="900" dirty="0" err="1">
+                <a:solidFill>
+                  <a:schemeClr val="tx1"/>
+                </a:solidFill>
+              </a:rPr>
+              <a:t>gets</a:t>
+            </a:r>
+            <a:r>
+              <a:rPr lang="de-CH" sz="900" dirty="0">
+                <a:solidFill>
+                  <a:schemeClr val="tx1"/>
+                </a:solidFill>
+              </a:rPr>
+              <a:t> </a:t>
+            </a:r>
+            <a:r>
+              <a:rPr lang="de-CH" sz="900" dirty="0" err="1">
+                <a:solidFill>
+                  <a:schemeClr val="tx1"/>
+                </a:solidFill>
+              </a:rPr>
+              <a:t>the</a:t>
+            </a:r>
+            <a:r>
+              <a:rPr lang="de-CH" sz="900" dirty="0">
+                <a:solidFill>
+                  <a:schemeClr val="tx1"/>
+                </a:solidFill>
+              </a:rPr>
+              <a:t> quest from </a:t>
+            </a:r>
+            <a:r>
+              <a:rPr lang="de-CH" sz="900" dirty="0" err="1">
+                <a:solidFill>
+                  <a:schemeClr val="tx1"/>
+                </a:solidFill>
+              </a:rPr>
+              <a:t>the</a:t>
+            </a:r>
+            <a:r>
+              <a:rPr lang="de-CH" sz="900" dirty="0">
+                <a:solidFill>
+                  <a:schemeClr val="tx1"/>
+                </a:solidFill>
+              </a:rPr>
+              <a:t> </a:t>
+            </a:r>
+            <a:r>
+              <a:rPr lang="de-CH" sz="900" dirty="0" err="1">
+                <a:solidFill>
+                  <a:schemeClr val="tx1"/>
+                </a:solidFill>
+              </a:rPr>
+              <a:t>questtag</a:t>
+            </a:r>
+            <a:r>
+              <a:rPr lang="de-CH" sz="900" dirty="0">
+                <a:solidFill>
+                  <a:schemeClr val="tx1"/>
+                </a:solidFill>
+              </a:rPr>
+              <a:t> and </a:t>
+            </a:r>
+            <a:r>
+              <a:rPr lang="de-CH" sz="900" dirty="0" err="1">
+                <a:solidFill>
+                  <a:schemeClr val="tx1"/>
+                </a:solidFill>
+              </a:rPr>
+              <a:t>creates</a:t>
+            </a:r>
+            <a:r>
+              <a:rPr lang="de-CH" sz="900" dirty="0">
+                <a:solidFill>
+                  <a:schemeClr val="tx1"/>
+                </a:solidFill>
+              </a:rPr>
+              <a:t> an </a:t>
+            </a:r>
+            <a:r>
+              <a:rPr lang="de-CH" sz="900" dirty="0" err="1">
+                <a:solidFill>
+                  <a:schemeClr val="tx1"/>
+                </a:solidFill>
+              </a:rPr>
+              <a:t>entry</a:t>
+            </a:r>
+            <a:r>
+              <a:rPr lang="de-CH" sz="900" dirty="0">
+                <a:solidFill>
+                  <a:schemeClr val="tx1"/>
+                </a:solidFill>
+              </a:rPr>
+              <a:t> </a:t>
+            </a:r>
+            <a:r>
+              <a:rPr lang="de-CH" sz="900" dirty="0" err="1">
+                <a:solidFill>
+                  <a:schemeClr val="tx1"/>
+                </a:solidFill>
+              </a:rPr>
+              <a:t>for</a:t>
+            </a:r>
+            <a:r>
+              <a:rPr lang="de-CH" sz="900" dirty="0">
+                <a:solidFill>
+                  <a:schemeClr val="tx1"/>
+                </a:solidFill>
+              </a:rPr>
+              <a:t> </a:t>
+            </a:r>
+            <a:r>
+              <a:rPr lang="de-CH" sz="900" dirty="0" err="1">
+                <a:solidFill>
+                  <a:schemeClr val="tx1"/>
+                </a:solidFill>
+              </a:rPr>
+              <a:t>it</a:t>
+            </a:r>
+            <a:r>
+              <a:rPr lang="de-CH" sz="900" dirty="0">
+                <a:solidFill>
+                  <a:schemeClr val="tx1"/>
+                </a:solidFill>
+              </a:rPr>
+              <a:t> in </a:t>
+            </a:r>
+            <a:r>
+              <a:rPr lang="de-CH" sz="900" dirty="0" err="1">
+                <a:solidFill>
+                  <a:schemeClr val="tx1"/>
+                </a:solidFill>
+              </a:rPr>
+              <a:t>playerstate</a:t>
+            </a:r>
+            <a:r>
+              <a:rPr lang="de-CH" sz="900" dirty="0">
+                <a:solidFill>
+                  <a:schemeClr val="tx1"/>
+                </a:solidFill>
+              </a:rPr>
+              <a:t>/</a:t>
+            </a:r>
+            <a:r>
+              <a:rPr lang="de-CH" sz="900" dirty="0" err="1">
+                <a:solidFill>
+                  <a:schemeClr val="tx1"/>
+                </a:solidFill>
+              </a:rPr>
+              <a:t>ActiveQuests</a:t>
+            </a:r>
             <a:endParaRPr lang="de-CH" sz="900" dirty="0">
               <a:solidFill>
                 <a:schemeClr val="tx1"/>
@@ -4822,6 +5044,13 @@
             </a:endParaRPr>
           </a:p>
           <a:p>
+            <a:endParaRPr lang="de-CH" sz="900" dirty="0">
+              <a:solidFill>
+                <a:schemeClr val="tx1"/>
+              </a:solidFill>
+            </a:endParaRPr>
+          </a:p>
+          <a:p>
             <a:r>
               <a:rPr lang="de-CH" sz="900" dirty="0">
                 <a:solidFill>
@@ -4902,6 +5131,38 @@
                   <a:schemeClr val="tx1"/>
                 </a:solidFill>
               </a:rPr>
+              <a:t>QuestTag</a:t>
+            </a:r>
+            <a:r>
+              <a:rPr lang="de-CH" sz="900" dirty="0">
+                <a:solidFill>
+                  <a:schemeClr val="tx1"/>
+                </a:solidFill>
+              </a:rPr>
+              <a:t>, </a:t>
+            </a:r>
+            <a:r>
+              <a:rPr lang="de-CH" sz="900" dirty="0" err="1">
+                <a:solidFill>
+                  <a:schemeClr val="tx1"/>
+                </a:solidFill>
+              </a:rPr>
+              <a:t>FGameplayTag</a:t>
+            </a:r>
+            <a:r>
+              <a:rPr lang="de-CH" sz="900" dirty="0">
+                <a:solidFill>
+                  <a:schemeClr val="tx1"/>
+                </a:solidFill>
+              </a:rPr>
+              <a:t> </a:t>
+            </a:r>
+            <a:r>
+              <a:rPr lang="de-CH" sz="900" dirty="0" err="1">
+                <a:solidFill>
+                  <a:schemeClr val="tx1"/>
+                </a:solidFill>
+              </a:rPr>
               <a:t>QuestStatus</a:t>
             </a:r>
             <a:r>
@@ -4910,8 +5171,512 @@
                   <a:schemeClr val="tx1"/>
                 </a:solidFill>
               </a:rPr>
-              <a:t>, int32 QuestObjectiveCount1, int32 QuestObjectiveCount2)</a:t>
-            </a:r>
+              <a:t>, int32 QuestObjectiveCount1, int32 QuestObjectiveCount2) – Updates </a:t>
+            </a:r>
+            <a:r>
+              <a:rPr lang="de-CH" sz="900" dirty="0" err="1">
+                <a:solidFill>
+                  <a:schemeClr val="tx1"/>
+                </a:solidFill>
+              </a:rPr>
+              <a:t>the</a:t>
+            </a:r>
+            <a:r>
+              <a:rPr lang="de-CH" sz="900" dirty="0">
+                <a:solidFill>
+                  <a:schemeClr val="tx1"/>
+                </a:solidFill>
+              </a:rPr>
+              <a:t> quest </a:t>
+            </a:r>
+            <a:r>
+              <a:rPr lang="de-CH" sz="900" dirty="0" err="1">
+                <a:solidFill>
+                  <a:schemeClr val="tx1"/>
+                </a:solidFill>
+              </a:rPr>
+              <a:t>data</a:t>
+            </a:r>
+            <a:r>
+              <a:rPr lang="de-CH" sz="900" dirty="0">
+                <a:solidFill>
+                  <a:schemeClr val="tx1"/>
+                </a:solidFill>
+              </a:rPr>
+              <a:t> in </a:t>
+            </a:r>
+            <a:r>
+              <a:rPr lang="de-CH" sz="900" dirty="0" err="1">
+                <a:solidFill>
+                  <a:schemeClr val="tx1"/>
+                </a:solidFill>
+              </a:rPr>
+              <a:t>playerstate</a:t>
+            </a:r>
+            <a:r>
+              <a:rPr lang="de-CH" sz="900" dirty="0">
+                <a:solidFill>
+                  <a:schemeClr val="tx1"/>
+                </a:solidFill>
+              </a:rPr>
+              <a:t>/</a:t>
+            </a:r>
+            <a:r>
+              <a:rPr lang="de-CH" sz="900" dirty="0" err="1">
+                <a:solidFill>
+                  <a:schemeClr val="tx1"/>
+                </a:solidFill>
+              </a:rPr>
+              <a:t>ActiveQuests</a:t>
+            </a:r>
+            <a:endParaRPr lang="de-CH" sz="900" dirty="0">
+              <a:solidFill>
+                <a:schemeClr val="tx1"/>
+              </a:solidFill>
+            </a:endParaRPr>
+          </a:p>
+          <a:p>
+            <a:endParaRPr lang="de-CH" sz="900" dirty="0">
+              <a:solidFill>
+                <a:schemeClr val="tx1"/>
+              </a:solidFill>
+            </a:endParaRPr>
+          </a:p>
+          <a:p>
+            <a:r>
+              <a:rPr lang="de-CH" sz="900" dirty="0">
+                <a:solidFill>
+                  <a:schemeClr val="tx1"/>
+                </a:solidFill>
+              </a:rPr>
+              <a:t>UFUNCTION(</a:t>
+            </a:r>
+            <a:r>
+              <a:rPr lang="de-CH" sz="900" dirty="0" err="1">
+                <a:solidFill>
+                  <a:schemeClr val="tx1"/>
+                </a:solidFill>
+              </a:rPr>
+              <a:t>BlueprintNativeEvent</a:t>
+            </a:r>
+            <a:r>
+              <a:rPr lang="de-CH" sz="900" dirty="0">
+                <a:solidFill>
+                  <a:schemeClr val="tx1"/>
+                </a:solidFill>
+              </a:rPr>
+              <a:t>)</a:t>
+            </a:r>
+          </a:p>
+          <a:p>
+            <a:r>
+              <a:rPr lang="de-CH" sz="900" dirty="0" err="1">
+                <a:solidFill>
+                  <a:schemeClr val="tx1"/>
+                </a:solidFill>
+              </a:rPr>
+              <a:t>void</a:t>
+            </a:r>
+            <a:r>
+              <a:rPr lang="de-CH" sz="900" dirty="0">
+                <a:solidFill>
+                  <a:schemeClr val="tx1"/>
+                </a:solidFill>
+              </a:rPr>
+              <a:t> </a:t>
+            </a:r>
+            <a:r>
+              <a:rPr lang="de-CH" sz="900" dirty="0" err="1">
+                <a:solidFill>
+                  <a:schemeClr val="tx1"/>
+                </a:solidFill>
+              </a:rPr>
+              <a:t>CompleteQuest</a:t>
+            </a:r>
+            <a:r>
+              <a:rPr lang="de-CH" sz="900" dirty="0">
+                <a:solidFill>
+                  <a:schemeClr val="tx1"/>
+                </a:solidFill>
+              </a:rPr>
+              <a:t>(</a:t>
+            </a:r>
+            <a:r>
+              <a:rPr lang="de-CH" sz="900" dirty="0" err="1">
+                <a:solidFill>
+                  <a:schemeClr val="tx1"/>
+                </a:solidFill>
+              </a:rPr>
+              <a:t>FGameplayTag</a:t>
+            </a:r>
+            <a:r>
+              <a:rPr lang="de-CH" sz="900" dirty="0">
+                <a:solidFill>
+                  <a:schemeClr val="tx1"/>
+                </a:solidFill>
+              </a:rPr>
+              <a:t> </a:t>
+            </a:r>
+            <a:r>
+              <a:rPr lang="de-CH" sz="900" dirty="0" err="1">
+                <a:solidFill>
+                  <a:schemeClr val="tx1"/>
+                </a:solidFill>
+              </a:rPr>
+              <a:t>QuestTag</a:t>
+            </a:r>
+            <a:r>
+              <a:rPr lang="de-CH" sz="900" dirty="0">
+                <a:solidFill>
+                  <a:schemeClr val="tx1"/>
+                </a:solidFill>
+              </a:rPr>
+              <a:t>) – </a:t>
+            </a:r>
+            <a:r>
+              <a:rPr lang="de-CH" sz="900" dirty="0" err="1">
+                <a:solidFill>
+                  <a:schemeClr val="tx1"/>
+                </a:solidFill>
+              </a:rPr>
+              <a:t>checks</a:t>
+            </a:r>
+            <a:r>
+              <a:rPr lang="de-CH" sz="900" dirty="0">
+                <a:solidFill>
+                  <a:schemeClr val="tx1"/>
+                </a:solidFill>
+              </a:rPr>
+              <a:t> </a:t>
+            </a:r>
+            <a:r>
+              <a:rPr lang="de-CH" sz="900" dirty="0" err="1">
+                <a:solidFill>
+                  <a:schemeClr val="tx1"/>
+                </a:solidFill>
+              </a:rPr>
+              <a:t>if</a:t>
+            </a:r>
+            <a:r>
+              <a:rPr lang="de-CH" sz="900" dirty="0">
+                <a:solidFill>
+                  <a:schemeClr val="tx1"/>
+                </a:solidFill>
+              </a:rPr>
+              <a:t> </a:t>
+            </a:r>
+            <a:r>
+              <a:rPr lang="de-CH" sz="900" dirty="0" err="1">
+                <a:solidFill>
+                  <a:schemeClr val="tx1"/>
+                </a:solidFill>
+              </a:rPr>
+              <a:t>the</a:t>
+            </a:r>
+            <a:r>
+              <a:rPr lang="de-CH" sz="900" dirty="0">
+                <a:solidFill>
+                  <a:schemeClr val="tx1"/>
+                </a:solidFill>
+              </a:rPr>
+              <a:t> quest </a:t>
+            </a:r>
+            <a:r>
+              <a:rPr lang="de-CH" sz="900" dirty="0" err="1">
+                <a:solidFill>
+                  <a:schemeClr val="tx1"/>
+                </a:solidFill>
+              </a:rPr>
+              <a:t>can</a:t>
+            </a:r>
+            <a:r>
+              <a:rPr lang="de-CH" sz="900" dirty="0">
+                <a:solidFill>
+                  <a:schemeClr val="tx1"/>
+                </a:solidFill>
+              </a:rPr>
+              <a:t> </a:t>
+            </a:r>
+            <a:r>
+              <a:rPr lang="de-CH" sz="900" dirty="0" err="1">
+                <a:solidFill>
+                  <a:schemeClr val="tx1"/>
+                </a:solidFill>
+              </a:rPr>
+              <a:t>be</a:t>
+            </a:r>
+            <a:r>
+              <a:rPr lang="de-CH" sz="900" dirty="0">
+                <a:solidFill>
+                  <a:schemeClr val="tx1"/>
+                </a:solidFill>
+              </a:rPr>
+              <a:t> </a:t>
+            </a:r>
+            <a:r>
+              <a:rPr lang="de-CH" sz="900" dirty="0" err="1">
+                <a:solidFill>
+                  <a:schemeClr val="tx1"/>
+                </a:solidFill>
+              </a:rPr>
+              <a:t>completed</a:t>
+            </a:r>
+            <a:r>
+              <a:rPr lang="de-CH" sz="900" dirty="0">
+                <a:solidFill>
+                  <a:schemeClr val="tx1"/>
+                </a:solidFill>
+              </a:rPr>
+              <a:t>. Moves </a:t>
+            </a:r>
+            <a:r>
+              <a:rPr lang="de-CH" sz="900" dirty="0" err="1">
+                <a:solidFill>
+                  <a:schemeClr val="tx1"/>
+                </a:solidFill>
+              </a:rPr>
+              <a:t>the</a:t>
+            </a:r>
+            <a:r>
+              <a:rPr lang="de-CH" sz="900" dirty="0">
+                <a:solidFill>
+                  <a:schemeClr val="tx1"/>
+                </a:solidFill>
+              </a:rPr>
+              <a:t> quest </a:t>
+            </a:r>
+            <a:r>
+              <a:rPr lang="de-CH" sz="900" dirty="0" err="1">
+                <a:solidFill>
+                  <a:schemeClr val="tx1"/>
+                </a:solidFill>
+              </a:rPr>
+              <a:t>to</a:t>
+            </a:r>
+            <a:r>
+              <a:rPr lang="de-CH" sz="900" dirty="0">
+                <a:solidFill>
+                  <a:schemeClr val="tx1"/>
+                </a:solidFill>
+              </a:rPr>
+              <a:t> </a:t>
+            </a:r>
+            <a:r>
+              <a:rPr lang="de-CH" sz="900" dirty="0" err="1">
+                <a:solidFill>
+                  <a:schemeClr val="tx1"/>
+                </a:solidFill>
+              </a:rPr>
+              <a:t>playerstate</a:t>
+            </a:r>
+            <a:r>
+              <a:rPr lang="de-CH" sz="900" dirty="0">
+                <a:solidFill>
+                  <a:schemeClr val="tx1"/>
+                </a:solidFill>
+              </a:rPr>
+              <a:t>/</a:t>
+            </a:r>
+            <a:r>
+              <a:rPr lang="de-CH" sz="900" dirty="0" err="1">
+                <a:solidFill>
+                  <a:schemeClr val="tx1"/>
+                </a:solidFill>
+              </a:rPr>
+              <a:t>CompletedQuests</a:t>
+            </a:r>
+            <a:r>
+              <a:rPr lang="de-CH" sz="900" dirty="0">
+                <a:solidFill>
+                  <a:schemeClr val="tx1"/>
+                </a:solidFill>
+              </a:rPr>
+              <a:t> and </a:t>
+            </a:r>
+            <a:r>
+              <a:rPr lang="de-CH" sz="900" dirty="0" err="1">
+                <a:solidFill>
+                  <a:schemeClr val="tx1"/>
+                </a:solidFill>
+              </a:rPr>
+              <a:t>grants</a:t>
+            </a:r>
+            <a:r>
+              <a:rPr lang="de-CH" sz="900" dirty="0">
+                <a:solidFill>
+                  <a:schemeClr val="tx1"/>
+                </a:solidFill>
+              </a:rPr>
+              <a:t> XP</a:t>
+            </a:r>
+          </a:p>
+          <a:p>
+            <a:endParaRPr lang="de-CH" sz="900" dirty="0">
+              <a:solidFill>
+                <a:schemeClr val="tx1"/>
+              </a:solidFill>
+            </a:endParaRPr>
+          </a:p>
+          <a:p>
+            <a:endParaRPr lang="de-CH" sz="900" dirty="0">
+              <a:solidFill>
+                <a:schemeClr val="tx1"/>
+              </a:solidFill>
+            </a:endParaRPr>
+          </a:p>
+          <a:p>
+            <a:endParaRPr lang="de-CH" sz="900" dirty="0">
+              <a:solidFill>
+                <a:schemeClr val="tx1"/>
+              </a:solidFill>
+            </a:endParaRPr>
+          </a:p>
+          <a:p>
+            <a:endParaRPr lang="de-CH" sz="900" dirty="0">
+              <a:solidFill>
+                <a:schemeClr val="tx1"/>
+              </a:solidFill>
+            </a:endParaRPr>
+          </a:p>
+          <a:p>
+            <a:endParaRPr lang="de-CH" sz="900" dirty="0">
+              <a:solidFill>
+                <a:schemeClr val="tx1"/>
+              </a:solidFill>
+            </a:endParaRPr>
+          </a:p>
+          <a:p>
+            <a:endParaRPr lang="de-CH" sz="900" dirty="0">
+              <a:solidFill>
+                <a:schemeClr val="tx1"/>
+              </a:solidFill>
+            </a:endParaRPr>
+          </a:p>
+          <a:p>
+            <a:endParaRPr lang="de-CH" sz="900" dirty="0">
+              <a:solidFill>
+                <a:schemeClr val="tx1"/>
+              </a:solidFill>
+            </a:endParaRPr>
+          </a:p>
+          <a:p>
+            <a:endParaRPr lang="de-CH" sz="900" dirty="0">
+              <a:solidFill>
+                <a:schemeClr val="tx1"/>
+              </a:solidFill>
+            </a:endParaRPr>
+          </a:p>
+          <a:p>
+            <a:endParaRPr lang="de-CH" sz="900" dirty="0">
+              <a:solidFill>
+                <a:schemeClr val="tx1"/>
+              </a:solidFill>
+            </a:endParaRPr>
+          </a:p>
+          <a:p>
+            <a:endParaRPr lang="de-CH" sz="900" dirty="0">
+              <a:solidFill>
+                <a:schemeClr val="tx1"/>
+              </a:solidFill>
+            </a:endParaRPr>
+          </a:p>
+          <a:p>
+            <a:endParaRPr lang="de-CH" sz="900" dirty="0">
+              <a:solidFill>
+                <a:schemeClr val="tx1"/>
+              </a:solidFill>
+            </a:endParaRPr>
+          </a:p>
+          <a:p>
+            <a:endParaRPr lang="de-CH" sz="900" dirty="0">
+              <a:solidFill>
+                <a:schemeClr val="tx1"/>
+              </a:solidFill>
+            </a:endParaRPr>
+          </a:p>
+          <a:p>
+            <a:endParaRPr lang="de-CH" sz="900" dirty="0">
+              <a:solidFill>
+                <a:schemeClr val="tx1"/>
+              </a:solidFill>
+            </a:endParaRPr>
+          </a:p>
+          <a:p>
+            <a:endParaRPr lang="de-CH" sz="900" dirty="0">
+              <a:solidFill>
+                <a:schemeClr val="tx1"/>
+              </a:solidFill>
+            </a:endParaRPr>
+          </a:p>
+          <a:p>
+            <a:endParaRPr lang="de-CH" sz="900" dirty="0">
+              <a:solidFill>
+                <a:schemeClr val="tx1"/>
+              </a:solidFill>
+            </a:endParaRPr>
+          </a:p>
+          <a:p>
+            <a:endParaRPr lang="de-CH" sz="900" dirty="0">
+              <a:solidFill>
+                <a:schemeClr val="tx1"/>
+              </a:solidFill>
+            </a:endParaRPr>
+          </a:p>
+          <a:p>
+            <a:endParaRPr lang="de-CH" sz="900" dirty="0">
+              <a:solidFill>
+                <a:schemeClr val="tx1"/>
+              </a:solidFill>
+            </a:endParaRPr>
+          </a:p>
+          <a:p>
+            <a:endParaRPr lang="de-CH" sz="900" dirty="0">
+              <a:solidFill>
+                <a:schemeClr val="tx1"/>
+              </a:solidFill>
+            </a:endParaRPr>
+          </a:p>
+          <a:p>
+            <a:endParaRPr lang="de-CH" sz="900" dirty="0">
+              <a:solidFill>
+                <a:schemeClr val="tx1"/>
+              </a:solidFill>
+            </a:endParaRPr>
+          </a:p>
+          <a:p>
+            <a:endParaRPr lang="de-CH" sz="900" dirty="0">
+              <a:solidFill>
+                <a:schemeClr val="tx1"/>
+              </a:solidFill>
+            </a:endParaRPr>
+          </a:p>
+          <a:p>
+            <a:endParaRPr lang="de-CH" sz="900" dirty="0">
+              <a:solidFill>
+                <a:schemeClr val="tx1"/>
+              </a:solidFill>
+            </a:endParaRPr>
+          </a:p>
+          <a:p>
+            <a:endParaRPr lang="de-CH" sz="900" dirty="0">
+              <a:solidFill>
+                <a:schemeClr val="tx1"/>
+              </a:solidFill>
+            </a:endParaRPr>
+          </a:p>
+          <a:p>
+            <a:endParaRPr lang="de-CH" sz="900" dirty="0">
+              <a:solidFill>
+                <a:schemeClr val="tx1"/>
+              </a:solidFill>
+            </a:endParaRPr>
+          </a:p>
+          <a:p>
+            <a:endParaRPr lang="de-CH" sz="900" dirty="0">
+              <a:solidFill>
+                <a:schemeClr val="tx1"/>
+              </a:solidFill>
+            </a:endParaRPr>
           </a:p>
         </p:txBody>
       </p:sp>
@@ -4929,7 +5694,7 @@
         </p:nvSpPr>
         <p:spPr>
           <a:xfrm>
-            <a:off x="525733" y="3429000"/>
+            <a:off x="525733" y="3219450"/>
             <a:ext cx="1691682" cy="369332"/>
           </a:xfrm>
           <a:prstGeom prst="rect">
@@ -4965,8 +5730,8 @@
         </p:nvSpPr>
         <p:spPr>
           <a:xfrm>
-            <a:off x="525733" y="5284304"/>
-            <a:ext cx="11228920" cy="1218997"/>
+            <a:off x="525733" y="5255998"/>
+            <a:ext cx="11228920" cy="1397411"/>
           </a:xfrm>
           <a:prstGeom prst="rect">
             <a:avLst/>
@@ -5085,90 +5850,235 @@
                   <a:schemeClr val="tx1"/>
                 </a:solidFill>
               </a:rPr>
-              <a:t>)</a:t>
-            </a:r>
-          </a:p>
-          <a:p>
-            <a:r>
-              <a:rPr lang="de-CH" sz="900" dirty="0" err="1">
-                <a:solidFill>
-                  <a:schemeClr val="tx1"/>
-                </a:solidFill>
-              </a:rPr>
-              <a:t>void</a:t>
-            </a:r>
-            <a:r>
-              <a:rPr lang="de-CH" sz="900" dirty="0">
-                <a:solidFill>
-                  <a:schemeClr val="tx1"/>
-                </a:solidFill>
-              </a:rPr>
-              <a:t> </a:t>
-            </a:r>
-            <a:r>
-              <a:rPr lang="de-CH" sz="900" dirty="0" err="1">
-                <a:solidFill>
-                  <a:schemeClr val="tx1"/>
-                </a:solidFill>
-              </a:rPr>
-              <a:t>UpdateQuestStatus_Implementation</a:t>
-            </a:r>
-            <a:r>
-              <a:rPr lang="de-CH" sz="900" dirty="0">
-                <a:solidFill>
-                  <a:schemeClr val="tx1"/>
-                </a:solidFill>
-              </a:rPr>
-              <a:t>(</a:t>
-            </a:r>
-            <a:r>
-              <a:rPr lang="de-CH" sz="900" dirty="0" err="1">
-                <a:solidFill>
-                  <a:schemeClr val="tx1"/>
-                </a:solidFill>
-              </a:rPr>
-              <a:t>FGameplayTag</a:t>
-            </a:r>
-            <a:r>
-              <a:rPr lang="de-CH" sz="900" dirty="0">
-                <a:solidFill>
-                  <a:schemeClr val="tx1"/>
-                </a:solidFill>
-              </a:rPr>
-              <a:t> </a:t>
-            </a:r>
-            <a:r>
-              <a:rPr lang="de-CH" sz="900" dirty="0" err="1">
-                <a:solidFill>
-                  <a:schemeClr val="tx1"/>
-                </a:solidFill>
-              </a:rPr>
-              <a:t>QuestStatus</a:t>
-            </a:r>
-            <a:r>
-              <a:rPr lang="de-CH" sz="900" dirty="0">
-                <a:solidFill>
-                  <a:schemeClr val="tx1"/>
-                </a:solidFill>
-              </a:rPr>
-              <a:t>, int32 QuestObjectiveCount1, int32 </a:t>
-            </a:r>
-            <a:r>
-              <a:rPr lang="de-CH" sz="900">
-                <a:solidFill>
-                  <a:schemeClr val="tx1"/>
-                </a:solidFill>
-              </a:rPr>
-              <a:t>QuestObjectiveCount2)</a:t>
-            </a:r>
-          </a:p>
-          <a:p>
+              <a:t>) </a:t>
+            </a:r>
+            <a:r>
+              <a:rPr lang="de-CH" sz="900" dirty="0" err="1">
+                <a:solidFill>
+                  <a:schemeClr val="tx1"/>
+                </a:solidFill>
+              </a:rPr>
+              <a:t>override</a:t>
+            </a:r>
             <a:endParaRPr lang="de-CH" sz="900" dirty="0">
               <a:solidFill>
                 <a:schemeClr val="tx1"/>
               </a:solidFill>
             </a:endParaRPr>
           </a:p>
+          <a:p>
+            <a:r>
+              <a:rPr lang="de-CH" sz="900" dirty="0">
+                <a:solidFill>
+                  <a:schemeClr val="tx1"/>
+                </a:solidFill>
+              </a:rPr>
+              <a:t>virtual </a:t>
+            </a:r>
+            <a:r>
+              <a:rPr lang="de-CH" sz="900" dirty="0" err="1">
+                <a:solidFill>
+                  <a:schemeClr val="tx1"/>
+                </a:solidFill>
+              </a:rPr>
+              <a:t>void</a:t>
+            </a:r>
+            <a:r>
+              <a:rPr lang="de-CH" sz="900" dirty="0">
+                <a:solidFill>
+                  <a:schemeClr val="tx1"/>
+                </a:solidFill>
+              </a:rPr>
+              <a:t> </a:t>
+            </a:r>
+            <a:r>
+              <a:rPr lang="de-CH" sz="900" dirty="0" err="1">
+                <a:solidFill>
+                  <a:schemeClr val="tx1"/>
+                </a:solidFill>
+              </a:rPr>
+              <a:t>UpdateQuestStatus_Implementation</a:t>
+            </a:r>
+            <a:r>
+              <a:rPr lang="de-CH" sz="900" dirty="0">
+                <a:solidFill>
+                  <a:schemeClr val="tx1"/>
+                </a:solidFill>
+              </a:rPr>
+              <a:t>(</a:t>
+            </a:r>
+            <a:r>
+              <a:rPr lang="de-CH" sz="900" dirty="0" err="1">
+                <a:solidFill>
+                  <a:schemeClr val="tx1"/>
+                </a:solidFill>
+              </a:rPr>
+              <a:t>FGameplayTag</a:t>
+            </a:r>
+            <a:r>
+              <a:rPr lang="de-CH" sz="900" dirty="0">
+                <a:solidFill>
+                  <a:schemeClr val="tx1"/>
+                </a:solidFill>
+              </a:rPr>
+              <a:t> </a:t>
+            </a:r>
+            <a:r>
+              <a:rPr lang="de-CH" sz="900" dirty="0" err="1">
+                <a:solidFill>
+                  <a:schemeClr val="tx1"/>
+                </a:solidFill>
+              </a:rPr>
+              <a:t>QuestTag</a:t>
+            </a:r>
+            <a:r>
+              <a:rPr lang="de-CH" sz="900" dirty="0">
+                <a:solidFill>
+                  <a:schemeClr val="tx1"/>
+                </a:solidFill>
+              </a:rPr>
+              <a:t>, </a:t>
+            </a:r>
+            <a:r>
+              <a:rPr lang="de-CH" sz="900" dirty="0" err="1">
+                <a:solidFill>
+                  <a:schemeClr val="tx1"/>
+                </a:solidFill>
+              </a:rPr>
+              <a:t>FGameplayTag</a:t>
+            </a:r>
+            <a:r>
+              <a:rPr lang="de-CH" sz="900" dirty="0">
+                <a:solidFill>
+                  <a:schemeClr val="tx1"/>
+                </a:solidFill>
+              </a:rPr>
+              <a:t> </a:t>
+            </a:r>
+            <a:r>
+              <a:rPr lang="de-CH" sz="900" dirty="0" err="1">
+                <a:solidFill>
+                  <a:schemeClr val="tx1"/>
+                </a:solidFill>
+              </a:rPr>
+              <a:t>QuestStatus</a:t>
+            </a:r>
+            <a:r>
+              <a:rPr lang="de-CH" sz="900" dirty="0">
+                <a:solidFill>
+                  <a:schemeClr val="tx1"/>
+                </a:solidFill>
+              </a:rPr>
+              <a:t>, int32 QuestObjectiveCount1, int32 QuestObjectiveCount2) </a:t>
+            </a:r>
+            <a:r>
+              <a:rPr lang="de-CH" sz="900" dirty="0" err="1">
+                <a:solidFill>
+                  <a:schemeClr val="tx1"/>
+                </a:solidFill>
+              </a:rPr>
+              <a:t>override</a:t>
+            </a:r>
+            <a:endParaRPr lang="de-CH" sz="900" dirty="0">
+              <a:solidFill>
+                <a:schemeClr val="tx1"/>
+              </a:solidFill>
+            </a:endParaRPr>
+          </a:p>
+          <a:p>
+            <a:r>
+              <a:rPr lang="de-CH" sz="900" dirty="0">
+                <a:solidFill>
+                  <a:schemeClr val="tx1"/>
+                </a:solidFill>
+              </a:rPr>
+              <a:t>virtual </a:t>
+            </a:r>
+            <a:r>
+              <a:rPr lang="de-CH" sz="900" dirty="0" err="1">
+                <a:solidFill>
+                  <a:schemeClr val="tx1"/>
+                </a:solidFill>
+              </a:rPr>
+              <a:t>void</a:t>
+            </a:r>
+            <a:r>
+              <a:rPr lang="de-CH" sz="900" dirty="0">
+                <a:solidFill>
+                  <a:schemeClr val="tx1"/>
+                </a:solidFill>
+              </a:rPr>
+              <a:t> </a:t>
+            </a:r>
+            <a:r>
+              <a:rPr lang="de-CH" sz="900" dirty="0" err="1">
+                <a:solidFill>
+                  <a:schemeClr val="tx1"/>
+                </a:solidFill>
+              </a:rPr>
+              <a:t>CompleteQuest</a:t>
+            </a:r>
+            <a:r>
+              <a:rPr lang="de-CH" sz="900" dirty="0">
+                <a:solidFill>
+                  <a:schemeClr val="tx1"/>
+                </a:solidFill>
+              </a:rPr>
+              <a:t>(</a:t>
+            </a:r>
+            <a:r>
+              <a:rPr lang="de-CH" sz="900" dirty="0" err="1">
+                <a:solidFill>
+                  <a:schemeClr val="tx1"/>
+                </a:solidFill>
+              </a:rPr>
+              <a:t>FGameplayTag</a:t>
+            </a:r>
+            <a:r>
+              <a:rPr lang="de-CH" sz="900" dirty="0">
+                <a:solidFill>
+                  <a:schemeClr val="tx1"/>
+                </a:solidFill>
+              </a:rPr>
+              <a:t> </a:t>
+            </a:r>
+            <a:r>
+              <a:rPr lang="de-CH" sz="900" dirty="0" err="1">
+                <a:solidFill>
+                  <a:schemeClr val="tx1"/>
+                </a:solidFill>
+              </a:rPr>
+              <a:t>QuestTag</a:t>
+            </a:r>
+            <a:r>
+              <a:rPr lang="de-CH" sz="900" dirty="0">
+                <a:solidFill>
+                  <a:schemeClr val="tx1"/>
+                </a:solidFill>
+              </a:rPr>
+              <a:t>) </a:t>
+            </a:r>
+            <a:r>
+              <a:rPr lang="de-CH" sz="900">
+                <a:solidFill>
+                  <a:schemeClr val="tx1"/>
+                </a:solidFill>
+              </a:rPr>
+              <a:t>override</a:t>
+            </a:r>
+            <a:endParaRPr lang="de-CH" sz="900" dirty="0">
+              <a:solidFill>
+                <a:schemeClr val="tx1"/>
+              </a:solidFill>
+            </a:endParaRPr>
+          </a:p>
+          <a:p>
+            <a:endParaRPr lang="de-CH" sz="900" dirty="0">
+              <a:solidFill>
+                <a:schemeClr val="tx1"/>
+              </a:solidFill>
+            </a:endParaRPr>
+          </a:p>
         </p:txBody>
       </p:sp>
       <p:sp>
@@ -5185,7 +6095,7 @@
         </p:nvSpPr>
         <p:spPr>
           <a:xfrm>
-            <a:off x="525733" y="4985547"/>
+            <a:off x="525733" y="4957241"/>
             <a:ext cx="1641347" cy="369332"/>
           </a:xfrm>
           <a:prstGeom prst="rect">

</xml_diff>